<commit_message>
networks in python and files updated
</commit_message>
<xml_diff>
--- a/My courses/Networks/Sesion8.pptx
+++ b/My courses/Networks/Sesion8.pptx
@@ -5,7 +5,7 @@
     <p:sldMasterId id="2147483678" r:id="rId1"/>
   </p:sldMasterIdLst>
   <p:notesMasterIdLst>
-    <p:notesMasterId r:id="rId15"/>
+    <p:notesMasterId r:id="rId16"/>
   </p:notesMasterIdLst>
   <p:sldIdLst>
     <p:sldId id="256" r:id="rId2"/>
@@ -21,6 +21,7 @@
     <p:sldId id="350" r:id="rId12"/>
     <p:sldId id="332" r:id="rId13"/>
     <p:sldId id="351" r:id="rId14"/>
+    <p:sldId id="357" r:id="rId15"/>
   </p:sldIdLst>
   <p:sldSz cx="12192000" cy="6858000"/>
   <p:notesSz cx="6858000" cy="9144000"/>
@@ -137,6 +138,7 @@
             <p14:sldId id="350"/>
             <p14:sldId id="332"/>
             <p14:sldId id="351"/>
+            <p14:sldId id="357"/>
           </p14:sldIdLst>
         </p14:section>
       </p14:sectionLst>
@@ -242,7 +244,7 @@
           <a:p>
             <a:fld id="{B2E8E9B9-1E63-4F39-B8D0-582BC410424E}" type="datetimeFigureOut">
               <a:rPr lang="es-CO" smtClean="0"/>
-              <a:t>30/08/2018</a:t>
+              <a:t>31/08/2018</a:t>
             </a:fld>
             <a:endParaRPr lang="es-CO"/>
           </a:p>
@@ -913,7 +915,7 @@
           <a:p>
             <a:fld id="{7686B5EC-4FB1-41B7-8670-53AEB2EB1F31}" type="datetime1">
               <a:rPr lang="es-CO" smtClean="0"/>
-              <a:t>30/08/2018</a:t>
+              <a:t>31/08/2018</a:t>
             </a:fld>
             <a:endParaRPr lang="es-CO"/>
           </a:p>
@@ -1092,7 +1094,7 @@
           <a:p>
             <a:fld id="{62E4560F-08EB-4591-90FD-AD5C1DC1F912}" type="datetime1">
               <a:rPr lang="es-CO" smtClean="0"/>
-              <a:t>30/08/2018</a:t>
+              <a:t>31/08/2018</a:t>
             </a:fld>
             <a:endParaRPr lang="es-CO"/>
           </a:p>
@@ -1272,7 +1274,7 @@
           <a:p>
             <a:fld id="{46C3FAB3-FA39-4B21-835A-5E3984399770}" type="datetime1">
               <a:rPr lang="es-CO" smtClean="0"/>
-              <a:t>30/08/2018</a:t>
+              <a:t>31/08/2018</a:t>
             </a:fld>
             <a:endParaRPr lang="es-CO"/>
           </a:p>
@@ -1442,7 +1444,7 @@
           <a:p>
             <a:fld id="{CE59C47A-37D4-4CD3-863B-E2426EE6CC8B}" type="datetime1">
               <a:rPr lang="es-CO" smtClean="0"/>
-              <a:t>30/08/2018</a:t>
+              <a:t>31/08/2018</a:t>
             </a:fld>
             <a:endParaRPr lang="es-CO"/>
           </a:p>
@@ -1755,7 +1757,7 @@
           <a:p>
             <a:fld id="{52D3C397-871A-486A-9EDA-A50E2540B44C}" type="datetime1">
               <a:rPr lang="es-CO" smtClean="0"/>
-              <a:t>30/08/2018</a:t>
+              <a:t>31/08/2018</a:t>
             </a:fld>
             <a:endParaRPr lang="es-CO"/>
           </a:p>
@@ -2141,7 +2143,7 @@
           <a:p>
             <a:fld id="{F5F208A2-D046-4CB3-B907-9AFEC6B4C15E}" type="datetime1">
               <a:rPr lang="es-CO" smtClean="0"/>
-              <a:t>30/08/2018</a:t>
+              <a:t>31/08/2018</a:t>
             </a:fld>
             <a:endParaRPr lang="es-CO"/>
           </a:p>
@@ -2575,7 +2577,7 @@
           <a:p>
             <a:fld id="{170543B1-7E09-44FA-9D8B-F7555B771CB0}" type="datetime1">
               <a:rPr lang="es-CO" smtClean="0"/>
-              <a:t>30/08/2018</a:t>
+              <a:t>31/08/2018</a:t>
             </a:fld>
             <a:endParaRPr lang="es-CO"/>
           </a:p>
@@ -2693,7 +2695,7 @@
           <a:p>
             <a:fld id="{08F7ECEC-DB93-4B02-ABB3-32DAF92FC469}" type="datetime1">
               <a:rPr lang="es-CO" smtClean="0"/>
-              <a:t>30/08/2018</a:t>
+              <a:t>31/08/2018</a:t>
             </a:fld>
             <a:endParaRPr lang="es-CO"/>
           </a:p>
@@ -2788,7 +2790,7 @@
           <a:p>
             <a:fld id="{FA3FB42F-D29F-4CA9-87B0-922206F8D5F8}" type="datetime1">
               <a:rPr lang="es-CO" smtClean="0"/>
-              <a:t>30/08/2018</a:t>
+              <a:t>31/08/2018</a:t>
             </a:fld>
             <a:endParaRPr lang="es-CO"/>
           </a:p>
@@ -3138,7 +3140,7 @@
           <a:p>
             <a:fld id="{2A2B69C3-9891-4BE4-9764-7F83AEDC17A0}" type="datetime1">
               <a:rPr lang="es-CO" smtClean="0"/>
-              <a:t>30/08/2018</a:t>
+              <a:t>31/08/2018</a:t>
             </a:fld>
             <a:endParaRPr lang="es-CO"/>
           </a:p>
@@ -3563,7 +3565,7 @@
           <a:p>
             <a:fld id="{2A1B9C8D-6C34-4E0F-8C0D-07BF18418F64}" type="datetime1">
               <a:rPr lang="es-CO" smtClean="0"/>
-              <a:t>30/08/2018</a:t>
+              <a:t>31/08/2018</a:t>
             </a:fld>
             <a:endParaRPr lang="es-CO"/>
           </a:p>
@@ -3844,7 +3846,7 @@
           <a:p>
             <a:fld id="{BBFFA07A-99AB-4C84-99F6-2A5A5CBA9238}" type="datetime1">
               <a:rPr lang="es-CO" smtClean="0"/>
-              <a:t>30/08/2018</a:t>
+              <a:t>31/08/2018</a:t>
             </a:fld>
             <a:endParaRPr lang="es-CO"/>
           </a:p>
@@ -5072,11 +5074,15 @@
             </a:r>
             <a:r>
               <a:rPr lang="es-CO" dirty="0" err="1" smtClean="0"/>
-              <a:t>Mtropolitan</a:t>
+              <a:t>Metropolitan</a:t>
             </a:r>
             <a:r>
               <a:rPr lang="es-CO" dirty="0" smtClean="0"/>
-              <a:t> Network)</a:t>
+              <a:t> </a:t>
+            </a:r>
+            <a:r>
+              <a:rPr lang="es-CO" dirty="0" smtClean="0"/>
+              <a:t>Network)</a:t>
             </a:r>
           </a:p>
           <a:p>
@@ -6710,6 +6716,143 @@
 </p:sld>
 </file>
 
+<file path=ppt/slides/slide14.xml><?xml version="1.0" encoding="utf-8"?>
+<p:sld xmlns:a="http://schemas.openxmlformats.org/drawingml/2006/main" xmlns:r="http://schemas.openxmlformats.org/officeDocument/2006/relationships" xmlns:p="http://schemas.openxmlformats.org/presentationml/2006/main">
+  <p:cSld>
+    <p:spTree>
+      <p:nvGrpSpPr>
+        <p:cNvPr id="1" name=""/>
+        <p:cNvGrpSpPr/>
+        <p:nvPr/>
+      </p:nvGrpSpPr>
+      <p:grpSpPr>
+        <a:xfrm>
+          <a:off x="0" y="0"/>
+          <a:ext cx="0" cy="0"/>
+          <a:chOff x="0" y="0"/>
+          <a:chExt cx="0" cy="0"/>
+        </a:xfrm>
+      </p:grpSpPr>
+      <p:sp>
+        <p:nvSpPr>
+          <p:cNvPr id="2" name="Título 1"/>
+          <p:cNvSpPr>
+            <a:spLocks noGrp="1"/>
+          </p:cNvSpPr>
+          <p:nvPr>
+            <p:ph type="title"/>
+          </p:nvPr>
+        </p:nvSpPr>
+        <p:spPr/>
+        <p:txBody>
+          <a:bodyPr/>
+          <a:lstStyle/>
+          <a:p>
+            <a:r>
+              <a:rPr lang="es-CO" dirty="0" smtClean="0"/>
+              <a:t>Referencias</a:t>
+            </a:r>
+            <a:endParaRPr lang="es-CO" dirty="0"/>
+          </a:p>
+        </p:txBody>
+      </p:sp>
+      <p:sp>
+        <p:nvSpPr>
+          <p:cNvPr id="3" name="Marcador de contenido 2"/>
+          <p:cNvSpPr>
+            <a:spLocks noGrp="1"/>
+          </p:cNvSpPr>
+          <p:nvPr>
+            <p:ph idx="1"/>
+          </p:nvPr>
+        </p:nvSpPr>
+        <p:spPr/>
+        <p:txBody>
+          <a:bodyPr/>
+          <a:lstStyle/>
+          <a:p>
+            <a:pPr marL="457200" indent="-457200">
+              <a:buFont typeface="+mj-lt"/>
+              <a:buAutoNum type="arabicPeriod"/>
+            </a:pPr>
+            <a:r>
+              <a:rPr lang="es-CO" dirty="0">
+                <a:hlinkClick r:id="rId2"/>
+              </a:rPr>
+              <a:t>https://</a:t>
+            </a:r>
+            <a:r>
+              <a:rPr lang="es-CO" dirty="0" smtClean="0">
+                <a:hlinkClick r:id="rId2"/>
+              </a:rPr>
+              <a:t>www.gettyimages.com/detail/news-photo/james-clerk-maxwell-scottish-physicist-circa-1875-news-photo/525524956</a:t>
+            </a:r>
+            <a:endParaRPr lang="es-CO" dirty="0" smtClean="0"/>
+          </a:p>
+          <a:p>
+            <a:pPr marL="457200" indent="-457200">
+              <a:buFont typeface="+mj-lt"/>
+              <a:buAutoNum type="arabicPeriod"/>
+            </a:pPr>
+            <a:r>
+              <a:rPr lang="es-CO" dirty="0">
+                <a:hlinkClick r:id="rId3"/>
+              </a:rPr>
+              <a:t>https://</a:t>
+            </a:r>
+            <a:r>
+              <a:rPr lang="es-CO" dirty="0" smtClean="0">
+                <a:hlinkClick r:id="rId3"/>
+              </a:rPr>
+              <a:t>www.tek.com/sites/default/files/media/image/hertz.png</a:t>
+            </a:r>
+            <a:endParaRPr lang="es-CO" dirty="0" smtClean="0"/>
+          </a:p>
+          <a:p>
+            <a:pPr marL="457200" indent="-457200">
+              <a:buFont typeface="+mj-lt"/>
+              <a:buAutoNum type="arabicPeriod"/>
+            </a:pPr>
+            <a:endParaRPr lang="es-CO" dirty="0"/>
+          </a:p>
+        </p:txBody>
+      </p:sp>
+      <p:sp>
+        <p:nvSpPr>
+          <p:cNvPr id="4" name="Marcador de número de diapositiva 3"/>
+          <p:cNvSpPr>
+            <a:spLocks noGrp="1"/>
+          </p:cNvSpPr>
+          <p:nvPr>
+            <p:ph type="sldNum" sz="quarter" idx="12"/>
+          </p:nvPr>
+        </p:nvSpPr>
+        <p:spPr/>
+        <p:txBody>
+          <a:bodyPr/>
+          <a:lstStyle/>
+          <a:p>
+            <a:fld id="{C5E5B3A9-79B5-4540-A326-FCC6F92DD987}" type="slidenum">
+              <a:rPr lang="es-CO" smtClean="0"/>
+              <a:t>14</a:t>
+            </a:fld>
+            <a:endParaRPr lang="es-CO"/>
+          </a:p>
+        </p:txBody>
+      </p:sp>
+    </p:spTree>
+    <p:extLst>
+      <p:ext uri="{BB962C8B-B14F-4D97-AF65-F5344CB8AC3E}">
+        <p14:creationId xmlns:p14="http://schemas.microsoft.com/office/powerpoint/2010/main" val="2829084269"/>
+      </p:ext>
+    </p:extLst>
+  </p:cSld>
+  <p:clrMapOvr>
+    <a:masterClrMapping/>
+  </p:clrMapOvr>
+</p:sld>
+</file>
+
 <file path=ppt/slides/slide2.xml><?xml version="1.0" encoding="utf-8"?>
 <p:sld xmlns:a="http://schemas.openxmlformats.org/drawingml/2006/main" xmlns:r="http://schemas.openxmlformats.org/officeDocument/2006/relationships" xmlns:p="http://schemas.openxmlformats.org/presentationml/2006/main">
   <p:cSld>
@@ -7225,15 +7368,7 @@
             <a:pPr lvl="1"/>
             <a:r>
               <a:rPr lang="es-MX" dirty="0" smtClean="0"/>
-              <a:t>Describa los medios de transmisión guiados. Describa los tipos de enlaces: medios magnéticos, par trenzado, cable coaxial, líneas eléctricas, fibra óptica (cables de fibras y comparación entre fibra óptica y </a:t>
-            </a:r>
-            <a:r>
-              <a:rPr lang="es-MX" dirty="0" smtClean="0"/>
-              <a:t>alambre de </a:t>
-            </a:r>
-            <a:r>
-              <a:rPr lang="es-MX" dirty="0" smtClean="0"/>
-              <a:t>cobre).</a:t>
+              <a:t>Describa los medios de transmisión guiados. Describa los tipos de enlaces: medios magnéticos, par trenzado, cable coaxial, líneas eléctricas, fibra óptica (cables de fibras y comparación entre fibra óptica y alambre de cobre).</a:t>
             </a:r>
           </a:p>
           <a:p>
@@ -7753,7 +7888,7 @@
           <a:bodyPr/>
           <a:lstStyle/>
           <a:p>
-            <a:endParaRPr lang="es-CO"/>
+            <a:endParaRPr lang="es-CO" dirty="0"/>
           </a:p>
         </p:txBody>
       </p:sp>
@@ -7822,7 +7957,7 @@
         <p:spPr>
           <a:xfrm>
             <a:off x="208580" y="5165080"/>
-            <a:ext cx="4807983" cy="369332"/>
+            <a:ext cx="5118965" cy="369332"/>
           </a:xfrm>
           <a:prstGeom prst="rect">
             <a:avLst/>
@@ -7840,7 +7975,15 @@
                 <a:ea typeface="Calibri" panose="020F0502020204030204" pitchFamily="34" charset="0"/>
                 <a:cs typeface="Times New Roman" panose="02020603050405020304" pitchFamily="18" charset="0"/>
               </a:rPr>
-              <a:t>James Clerk Maxwell predijo estas ondas en 1865</a:t>
+              <a:t>James Clerk Maxwell predijo estas ondas en </a:t>
+            </a:r>
+            <a:r>
+              <a:rPr lang="es-CO" dirty="0" smtClean="0">
+                <a:latin typeface="Calibri" panose="020F0502020204030204" pitchFamily="34" charset="0"/>
+                <a:ea typeface="Calibri" panose="020F0502020204030204" pitchFamily="34" charset="0"/>
+                <a:cs typeface="Times New Roman" panose="02020603050405020304" pitchFamily="18" charset="0"/>
+              </a:rPr>
+              <a:t>1865 [1]</a:t>
             </a:r>
             <a:endParaRPr lang="es-CO" dirty="0"/>
           </a:p>
@@ -7888,7 +8031,7 @@
         <p:spPr>
           <a:xfrm>
             <a:off x="6099048" y="5165080"/>
-            <a:ext cx="4986493" cy="369332"/>
+            <a:ext cx="5297476" cy="369332"/>
           </a:xfrm>
           <a:prstGeom prst="rect">
             <a:avLst/>
@@ -7906,7 +8049,15 @@
                 <a:ea typeface="Calibri" panose="020F0502020204030204" pitchFamily="34" charset="0"/>
                 <a:cs typeface="Times New Roman" panose="02020603050405020304" pitchFamily="18" charset="0"/>
               </a:rPr>
-              <a:t>Heinrich Hertz las observó por primera vez en 1887</a:t>
+              <a:t>Heinrich Hertz las observó por primera vez en </a:t>
+            </a:r>
+            <a:r>
+              <a:rPr lang="es-CO" dirty="0" smtClean="0">
+                <a:latin typeface="Calibri" panose="020F0502020204030204" pitchFamily="34" charset="0"/>
+                <a:ea typeface="Calibri" panose="020F0502020204030204" pitchFamily="34" charset="0"/>
+                <a:cs typeface="Times New Roman" panose="02020603050405020304" pitchFamily="18" charset="0"/>
+              </a:rPr>
+              <a:t>1887 [2]</a:t>
             </a:r>
             <a:endParaRPr lang="es-CO" dirty="0"/>
           </a:p>
@@ -8083,6 +8234,53 @@
           </a:ln>
         </p:spPr>
       </p:pic>
+      <p:pic>
+        <p:nvPicPr>
+          <p:cNvPr id="7" name="Picture 2" descr="Resultado de imagen para icesi a otro nivel">
+            <a:extLst>
+              <a:ext uri="{FF2B5EF4-FFF2-40B4-BE49-F238E27FC236}">
+                <a16:creationId xmlns:a16="http://schemas.microsoft.com/office/drawing/2014/main" id="{D7F490AC-5003-4CAB-99EE-50151E9B8008}"/>
+              </a:ext>
+            </a:extLst>
+          </p:cNvPr>
+          <p:cNvPicPr>
+            <a:picLocks noChangeAspect="1" noChangeArrowheads="1"/>
+          </p:cNvPicPr>
+          <p:nvPr/>
+        </p:nvPicPr>
+        <p:blipFill>
+          <a:blip r:embed="rId4">
+            <a:extLst>
+              <a:ext uri="{28A0092B-C50C-407E-A947-70E740481C1C}">
+                <a14:useLocalDpi xmlns:a14="http://schemas.microsoft.com/office/drawing/2010/main" val="0"/>
+              </a:ext>
+            </a:extLst>
+          </a:blip>
+          <a:srcRect/>
+          <a:stretch>
+            <a:fillRect/>
+          </a:stretch>
+        </p:blipFill>
+        <p:spPr bwMode="auto">
+          <a:xfrm>
+            <a:off x="0" y="6181436"/>
+            <a:ext cx="2436655" cy="685800"/>
+          </a:xfrm>
+          <a:prstGeom prst="rect">
+            <a:avLst/>
+          </a:prstGeom>
+          <a:noFill/>
+          <a:extLst>
+            <a:ext uri="{909E8E84-426E-40DD-AFC4-6F175D3DCCD1}">
+              <a14:hiddenFill xmlns:a14="http://schemas.microsoft.com/office/drawing/2010/main">
+                <a:solidFill>
+                  <a:srgbClr val="FFFFFF"/>
+                </a:solidFill>
+              </a14:hiddenFill>
+            </a:ext>
+          </a:extLst>
+        </p:spPr>
+      </p:pic>
     </p:spTree>
     <p:extLst>
       <p:ext uri="{BB962C8B-B14F-4D97-AF65-F5344CB8AC3E}">
@@ -8216,6 +8414,53 @@
           <a:ln>
             <a:noFill/>
           </a:ln>
+        </p:spPr>
+      </p:pic>
+      <p:pic>
+        <p:nvPicPr>
+          <p:cNvPr id="6" name="Picture 2" descr="Resultado de imagen para icesi a otro nivel">
+            <a:extLst>
+              <a:ext uri="{FF2B5EF4-FFF2-40B4-BE49-F238E27FC236}">
+                <a16:creationId xmlns:a16="http://schemas.microsoft.com/office/drawing/2014/main" id="{D7F490AC-5003-4CAB-99EE-50151E9B8008}"/>
+              </a:ext>
+            </a:extLst>
+          </p:cNvPr>
+          <p:cNvPicPr>
+            <a:picLocks noChangeAspect="1" noChangeArrowheads="1"/>
+          </p:cNvPicPr>
+          <p:nvPr/>
+        </p:nvPicPr>
+        <p:blipFill>
+          <a:blip r:embed="rId3">
+            <a:extLst>
+              <a:ext uri="{28A0092B-C50C-407E-A947-70E740481C1C}">
+                <a14:useLocalDpi xmlns:a14="http://schemas.microsoft.com/office/drawing/2010/main" val="0"/>
+              </a:ext>
+            </a:extLst>
+          </a:blip>
+          <a:srcRect/>
+          <a:stretch>
+            <a:fillRect/>
+          </a:stretch>
+        </p:blipFill>
+        <p:spPr bwMode="auto">
+          <a:xfrm>
+            <a:off x="0" y="6181436"/>
+            <a:ext cx="2436655" cy="685800"/>
+          </a:xfrm>
+          <a:prstGeom prst="rect">
+            <a:avLst/>
+          </a:prstGeom>
+          <a:noFill/>
+          <a:extLst>
+            <a:ext uri="{909E8E84-426E-40DD-AFC4-6F175D3DCCD1}">
+              <a14:hiddenFill xmlns:a14="http://schemas.microsoft.com/office/drawing/2010/main">
+                <a:solidFill>
+                  <a:srgbClr val="FFFFFF"/>
+                </a:solidFill>
+              </a14:hiddenFill>
+            </a:ext>
+          </a:extLst>
         </p:spPr>
       </p:pic>
     </p:spTree>

</xml_diff>